<commit_message>
correccion errores en el ppt
</commit_message>
<xml_diff>
--- a/Documentos/Presentación_hito3.pptx
+++ b/Documentos/Presentación_hito3.pptx
@@ -209,7 +209,7 @@
           <a:p>
             <a:fld id="{1E03D151-F01C-F04C-8189-8B6BB9DD1F2E}" type="datetimeFigureOut">
               <a:rPr lang="es-ES_tradnl" smtClean="0"/>
-              <a:t>8/4/17</a:t>
+              <a:t>10/4/17</a:t>
             </a:fld>
             <a:endParaRPr lang="es-ES_tradnl"/>
           </a:p>
@@ -751,7 +751,7 @@
           <a:p>
             <a:fld id="{78ABE3C1-DBE1-495D-B57B-2849774B866A}" type="datetimeFigureOut">
               <a:rPr lang="en-US" smtClean="0"/>
-              <a:t>4/8/17</a:t>
+              <a:t>4/10/17</a:t>
             </a:fld>
             <a:endParaRPr lang="en-US" dirty="0"/>
           </a:p>
@@ -1165,7 +1165,7 @@
           <a:p>
             <a:fld id="{9D6E9DEC-419B-4CC5-A080-3B06BD5A8291}" type="datetimeFigureOut">
               <a:rPr lang="en-US" smtClean="0"/>
-              <a:t>4/8/17</a:t>
+              <a:t>4/10/17</a:t>
             </a:fld>
             <a:endParaRPr lang="en-US" dirty="0"/>
           </a:p>
@@ -1498,7 +1498,7 @@
           <a:p>
             <a:fld id="{9D6E9DEC-419B-4CC5-A080-3B06BD5A8291}" type="datetimeFigureOut">
               <a:rPr lang="en-US" smtClean="0"/>
-              <a:t>4/8/17</a:t>
+              <a:t>4/10/17</a:t>
             </a:fld>
             <a:endParaRPr lang="en-US" dirty="0"/>
           </a:p>
@@ -1900,7 +1900,7 @@
           <a:p>
             <a:fld id="{9D6E9DEC-419B-4CC5-A080-3B06BD5A8291}" type="datetimeFigureOut">
               <a:rPr lang="en-US" smtClean="0"/>
-              <a:t>4/8/17</a:t>
+              <a:t>4/10/17</a:t>
             </a:fld>
             <a:endParaRPr lang="en-US" dirty="0"/>
           </a:p>
@@ -2465,7 +2465,7 @@
           <a:p>
             <a:fld id="{9D6E9DEC-419B-4CC5-A080-3B06BD5A8291}" type="datetimeFigureOut">
               <a:rPr lang="en-US" smtClean="0"/>
-              <a:t>4/8/17</a:t>
+              <a:t>4/10/17</a:t>
             </a:fld>
             <a:endParaRPr lang="en-US" dirty="0"/>
           </a:p>
@@ -3143,7 +3143,7 @@
           <a:p>
             <a:fld id="{9D6E9DEC-419B-4CC5-A080-3B06BD5A8291}" type="datetimeFigureOut">
               <a:rPr lang="en-US" smtClean="0"/>
-              <a:t>4/8/17</a:t>
+              <a:t>4/10/17</a:t>
             </a:fld>
             <a:endParaRPr lang="en-US" dirty="0"/>
           </a:p>
@@ -4053,7 +4053,7 @@
           <a:p>
             <a:fld id="{9D6E9DEC-419B-4CC5-A080-3B06BD5A8291}" type="datetimeFigureOut">
               <a:rPr lang="en-US" smtClean="0"/>
-              <a:t>4/8/17</a:t>
+              <a:t>4/10/17</a:t>
             </a:fld>
             <a:endParaRPr lang="en-US" dirty="0"/>
           </a:p>
@@ -4363,7 +4363,7 @@
           <a:p>
             <a:fld id="{1FA3F48C-C7C6-4055-9F49-3777875E72AE}" type="datetimeFigureOut">
               <a:rPr lang="en-US" smtClean="0"/>
-              <a:t>4/8/17</a:t>
+              <a:t>4/10/17</a:t>
             </a:fld>
             <a:endParaRPr lang="en-US" dirty="0"/>
           </a:p>
@@ -4622,7 +4622,7 @@
           <a:p>
             <a:fld id="{6178E61D-D431-422C-9764-11DAFE33AB63}" type="datetimeFigureOut">
               <a:rPr lang="en-US" smtClean="0"/>
-              <a:t>4/8/17</a:t>
+              <a:t>4/10/17</a:t>
             </a:fld>
             <a:endParaRPr lang="en-US" dirty="0"/>
           </a:p>
@@ -4941,7 +4941,7 @@
           <a:p>
             <a:fld id="{12DE42F4-6EEF-4EF7-8ED4-2208F0F89A08}" type="datetimeFigureOut">
               <a:rPr lang="en-US" smtClean="0"/>
-              <a:t>4/8/17</a:t>
+              <a:t>4/10/17</a:t>
             </a:fld>
             <a:endParaRPr lang="en-US" dirty="0"/>
           </a:p>
@@ -5325,7 +5325,7 @@
           <a:p>
             <a:fld id="{30578ACC-22D6-47C1-A373-4FD133E34F3C}" type="datetimeFigureOut">
               <a:rPr lang="en-US" smtClean="0"/>
-              <a:t>4/8/17</a:t>
+              <a:t>4/10/17</a:t>
             </a:fld>
             <a:endParaRPr lang="en-US" dirty="0"/>
           </a:p>
@@ -5696,7 +5696,7 @@
           <a:p>
             <a:fld id="{4E5A6C69-6797-4E8A-BF37-F2C3751466E9}" type="datetimeFigureOut">
               <a:rPr lang="en-US" smtClean="0"/>
-              <a:t>4/8/17</a:t>
+              <a:t>4/10/17</a:t>
             </a:fld>
             <a:endParaRPr lang="en-US" dirty="0"/>
           </a:p>
@@ -6197,7 +6197,7 @@
           <a:p>
             <a:fld id="{D82014A1-A632-4878-A0D3-F52BA7563730}" type="datetimeFigureOut">
               <a:rPr lang="en-US" smtClean="0"/>
-              <a:t>4/8/17</a:t>
+              <a:t>4/10/17</a:t>
             </a:fld>
             <a:endParaRPr lang="en-US" dirty="0"/>
           </a:p>
@@ -6449,7 +6449,7 @@
           <a:p>
             <a:fld id="{CE99F462-093F-4566-844B-4C71F2739DA5}" type="datetimeFigureOut">
               <a:rPr lang="en-US" smtClean="0"/>
-              <a:t>4/8/17</a:t>
+              <a:t>4/10/17</a:t>
             </a:fld>
             <a:endParaRPr lang="en-US" dirty="0"/>
           </a:p>
@@ -6607,7 +6607,7 @@
           <a:p>
             <a:fld id="{3D24A7AC-904D-4781-85BA-7D10C17ED021}" type="datetimeFigureOut">
               <a:rPr lang="en-US" smtClean="0"/>
-              <a:t>4/8/17</a:t>
+              <a:t>4/10/17</a:t>
             </a:fld>
             <a:endParaRPr lang="en-US" dirty="0"/>
           </a:p>
@@ -6997,7 +6997,7 @@
           <a:p>
             <a:fld id="{E331444B-B92B-4E27-8C94-BB93EAF5CB18}" type="datetimeFigureOut">
               <a:rPr lang="en-US" smtClean="0"/>
-              <a:t>4/8/17</a:t>
+              <a:t>4/10/17</a:t>
             </a:fld>
             <a:endParaRPr lang="en-US" dirty="0"/>
           </a:p>
@@ -7406,7 +7406,7 @@
           <a:p>
             <a:fld id="{363EFA5E-FA76-400D-B3DC-F0BA90E6D107}" type="datetimeFigureOut">
               <a:rPr lang="en-US" smtClean="0"/>
-              <a:t>4/8/17</a:t>
+              <a:t>4/10/17</a:t>
             </a:fld>
             <a:endParaRPr lang="en-US" dirty="0"/>
           </a:p>
@@ -7645,7 +7645,7 @@
           <a:p>
             <a:fld id="{9D6E9DEC-419B-4CC5-A080-3B06BD5A8291}" type="datetimeFigureOut">
               <a:rPr lang="en-US" smtClean="0"/>
-              <a:t>4/8/17</a:t>
+              <a:t>4/10/17</a:t>
             </a:fld>
             <a:endParaRPr lang="en-US" dirty="0"/>
           </a:p>
@@ -8301,7 +8301,7 @@
         </p:nvSpPr>
         <p:spPr>
           <a:xfrm>
-            <a:off x="363575" y="5725636"/>
+            <a:off x="505534" y="5814322"/>
             <a:ext cx="545939" cy="369332"/>
           </a:xfrm>
           <a:prstGeom prst="rect">
@@ -8316,8 +8316,8 @@
           <a:lstStyle/>
           <a:p>
             <a:r>
-              <a:rPr lang="es-ES_tradnl" dirty="0" smtClean="0"/>
-              <a:t>14</a:t>
+              <a:rPr lang="es-ES_tradnl"/>
+              <a:t>9</a:t>
             </a:r>
             <a:endParaRPr lang="es-ES_tradnl" dirty="0"/>
           </a:p>
@@ -9141,8 +9141,8 @@
         </p:nvSpPr>
         <p:spPr>
           <a:xfrm>
-            <a:off x="7308229" y="5430348"/>
-            <a:ext cx="313994" cy="369332"/>
+            <a:off x="7185420" y="5430348"/>
+            <a:ext cx="436803" cy="369332"/>
           </a:xfrm>
           <a:prstGeom prst="rect">
             <a:avLst/>
@@ -9156,10 +9156,9 @@
           <a:lstStyle/>
           <a:p>
             <a:r>
-              <a:rPr lang="es-ES_tradnl" dirty="0" smtClean="0"/>
-              <a:t>6</a:t>
-            </a:r>
-            <a:endParaRPr lang="es-ES_tradnl" dirty="0"/>
+              <a:rPr lang="es-ES_tradnl" smtClean="0"/>
+              <a:t>32</a:t>
+            </a:r>
           </a:p>
         </p:txBody>
       </p:sp>

</xml_diff>